<commit_message>
JDT, IncQuery doc added.
</commit_message>
<xml_diff>
--- a/incquery-deps-documentation/visio-diagrams/diagram-source.pptx
+++ b/incquery-deps-documentation/visio-diagrams/diagram-source.pptx
@@ -5,11 +5,13 @@
     <p:sldMasterId id="2147483648" r:id="rId1"/>
   </p:sldMasterIdLst>
   <p:notesMasterIdLst>
-    <p:notesMasterId r:id="rId4"/>
+    <p:notesMasterId r:id="rId6"/>
   </p:notesMasterIdLst>
   <p:sldIdLst>
     <p:sldId id="259" r:id="rId2"/>
     <p:sldId id="256" r:id="rId3"/>
+    <p:sldId id="261" r:id="rId4"/>
+    <p:sldId id="260" r:id="rId5"/>
   </p:sldIdLst>
   <p:sldSz cx="6858000" cy="9906000" type="A4"/>
   <p:notesSz cx="6858000" cy="9144000"/>
@@ -117,6 +119,12 @@
             <p14:sldId id="256"/>
           </p14:sldIdLst>
         </p14:section>
+        <p14:section name="Java runtime" id="{AE4E346D-51BB-444E-8C3F-15CE17C6F1F2}">
+          <p14:sldIdLst>
+            <p14:sldId id="261"/>
+            <p14:sldId id="260"/>
+          </p14:sldIdLst>
+        </p14:section>
       </p14:sectionLst>
     </p:ext>
   </p:extLst>
@@ -205,7 +213,7 @@
           <a:p>
             <a:fld id="{066D07CF-11C7-4B9C-BCBF-E2D9FCA17911}" type="datetimeFigureOut">
               <a:rPr lang="hu-HU" smtClean="0"/>
-              <a:t>2012.10.08.</a:t>
+              <a:t>2012.10.12.</a:t>
             </a:fld>
             <a:endParaRPr lang="hu-HU"/>
           </a:p>
@@ -738,7 +746,7 @@
           <a:p>
             <a:fld id="{109A3B03-3B51-4BDD-9DD7-3CEC69C24252}" type="datetimeFigureOut">
               <a:rPr lang="hu-HU" smtClean="0"/>
-              <a:t>2012.10.08.</a:t>
+              <a:t>2012.10.12.</a:t>
             </a:fld>
             <a:endParaRPr lang="hu-HU"/>
           </a:p>
@@ -908,7 +916,7 @@
           <a:p>
             <a:fld id="{109A3B03-3B51-4BDD-9DD7-3CEC69C24252}" type="datetimeFigureOut">
               <a:rPr lang="hu-HU" smtClean="0"/>
-              <a:t>2012.10.08.</a:t>
+              <a:t>2012.10.12.</a:t>
             </a:fld>
             <a:endParaRPr lang="hu-HU"/>
           </a:p>
@@ -1088,7 +1096,7 @@
           <a:p>
             <a:fld id="{109A3B03-3B51-4BDD-9DD7-3CEC69C24252}" type="datetimeFigureOut">
               <a:rPr lang="hu-HU" smtClean="0"/>
-              <a:t>2012.10.08.</a:t>
+              <a:t>2012.10.12.</a:t>
             </a:fld>
             <a:endParaRPr lang="hu-HU"/>
           </a:p>
@@ -1258,7 +1266,7 @@
           <a:p>
             <a:fld id="{109A3B03-3B51-4BDD-9DD7-3CEC69C24252}" type="datetimeFigureOut">
               <a:rPr lang="hu-HU" smtClean="0"/>
-              <a:t>2012.10.08.</a:t>
+              <a:t>2012.10.12.</a:t>
             </a:fld>
             <a:endParaRPr lang="hu-HU"/>
           </a:p>
@@ -1504,7 +1512,7 @@
           <a:p>
             <a:fld id="{109A3B03-3B51-4BDD-9DD7-3CEC69C24252}" type="datetimeFigureOut">
               <a:rPr lang="hu-HU" smtClean="0"/>
-              <a:t>2012.10.08.</a:t>
+              <a:t>2012.10.12.</a:t>
             </a:fld>
             <a:endParaRPr lang="hu-HU"/>
           </a:p>
@@ -1792,7 +1800,7 @@
           <a:p>
             <a:fld id="{109A3B03-3B51-4BDD-9DD7-3CEC69C24252}" type="datetimeFigureOut">
               <a:rPr lang="hu-HU" smtClean="0"/>
-              <a:t>2012.10.08.</a:t>
+              <a:t>2012.10.12.</a:t>
             </a:fld>
             <a:endParaRPr lang="hu-HU"/>
           </a:p>
@@ -2214,7 +2222,7 @@
           <a:p>
             <a:fld id="{109A3B03-3B51-4BDD-9DD7-3CEC69C24252}" type="datetimeFigureOut">
               <a:rPr lang="hu-HU" smtClean="0"/>
-              <a:t>2012.10.08.</a:t>
+              <a:t>2012.10.12.</a:t>
             </a:fld>
             <a:endParaRPr lang="hu-HU"/>
           </a:p>
@@ -2332,7 +2340,7 @@
           <a:p>
             <a:fld id="{109A3B03-3B51-4BDD-9DD7-3CEC69C24252}" type="datetimeFigureOut">
               <a:rPr lang="hu-HU" smtClean="0"/>
-              <a:t>2012.10.08.</a:t>
+              <a:t>2012.10.12.</a:t>
             </a:fld>
             <a:endParaRPr lang="hu-HU"/>
           </a:p>
@@ -2427,7 +2435,7 @@
           <a:p>
             <a:fld id="{109A3B03-3B51-4BDD-9DD7-3CEC69C24252}" type="datetimeFigureOut">
               <a:rPr lang="hu-HU" smtClean="0"/>
-              <a:t>2012.10.08.</a:t>
+              <a:t>2012.10.12.</a:t>
             </a:fld>
             <a:endParaRPr lang="hu-HU"/>
           </a:p>
@@ -2704,7 +2712,7 @@
           <a:p>
             <a:fld id="{109A3B03-3B51-4BDD-9DD7-3CEC69C24252}" type="datetimeFigureOut">
               <a:rPr lang="hu-HU" smtClean="0"/>
-              <a:t>2012.10.08.</a:t>
+              <a:t>2012.10.12.</a:t>
             </a:fld>
             <a:endParaRPr lang="hu-HU"/>
           </a:p>
@@ -2957,7 +2965,7 @@
           <a:p>
             <a:fld id="{109A3B03-3B51-4BDD-9DD7-3CEC69C24252}" type="datetimeFigureOut">
               <a:rPr lang="hu-HU" smtClean="0"/>
-              <a:t>2012.10.08.</a:t>
+              <a:t>2012.10.12.</a:t>
             </a:fld>
             <a:endParaRPr lang="hu-HU"/>
           </a:p>
@@ -3170,7 +3178,7 @@
           <a:p>
             <a:fld id="{109A3B03-3B51-4BDD-9DD7-3CEC69C24252}" type="datetimeFigureOut">
               <a:rPr lang="hu-HU" smtClean="0"/>
-              <a:t>2012.10.08.</a:t>
+              <a:t>2012.10.12.</a:t>
             </a:fld>
             <a:endParaRPr lang="hu-HU"/>
           </a:p>
@@ -4370,11 +4378,6 @@
               </a:rPr>
               <a:t>Central repository management</a:t>
             </a:r>
-            <a:endParaRPr lang="en-US" dirty="0">
-              <a:solidFill>
-                <a:schemeClr val="tx2"/>
-              </a:solidFill>
-            </a:endParaRPr>
           </a:p>
         </p:txBody>
       </p:sp>
@@ -4896,11 +4899,7 @@
             <a:pPr algn="r"/>
             <a:r>
               <a:rPr lang="en-US" sz="1400" dirty="0" smtClean="0"/>
-              <a:t>s</a:t>
-            </a:r>
-            <a:r>
-              <a:rPr lang="en-US" sz="1400" dirty="0" smtClean="0"/>
-              <a:t>tate</a:t>
+              <a:t>state</a:t>
             </a:r>
           </a:p>
           <a:p>
@@ -7451,6 +7450,934 @@
       </p:par>
     </p:tnLst>
   </p:timing>
+</p:sld>
+</file>
+
+<file path=ppt/slides/slide3.xml><?xml version="1.0" encoding="utf-8"?>
+<p:sld xmlns:a="http://schemas.openxmlformats.org/drawingml/2006/main" xmlns:r="http://schemas.openxmlformats.org/officeDocument/2006/relationships" xmlns:p="http://schemas.openxmlformats.org/presentationml/2006/main">
+  <p:cSld>
+    <p:spTree>
+      <p:nvGrpSpPr>
+        <p:cNvPr id="1" name=""/>
+        <p:cNvGrpSpPr/>
+        <p:nvPr/>
+      </p:nvGrpSpPr>
+      <p:grpSpPr>
+        <a:xfrm>
+          <a:off x="0" y="0"/>
+          <a:ext cx="0" cy="0"/>
+          <a:chOff x="0" y="0"/>
+          <a:chExt cx="0" cy="0"/>
+        </a:xfrm>
+      </p:grpSpPr>
+      <p:sp>
+        <p:nvSpPr>
+          <p:cNvPr id="2" name="Snip Single Corner Rectangle 1"/>
+          <p:cNvSpPr/>
+          <p:nvPr/>
+        </p:nvSpPr>
+        <p:spPr>
+          <a:xfrm>
+            <a:off x="245070" y="1004045"/>
+            <a:ext cx="1002754" cy="1368152"/>
+          </a:xfrm>
+          <a:prstGeom prst="snip1Rect">
+            <a:avLst/>
+          </a:prstGeom>
+        </p:spPr>
+        <p:style>
+          <a:lnRef idx="2">
+            <a:schemeClr val="accent1"/>
+          </a:lnRef>
+          <a:fillRef idx="1">
+            <a:schemeClr val="lt1"/>
+          </a:fillRef>
+          <a:effectRef idx="0">
+            <a:schemeClr val="accent1"/>
+          </a:effectRef>
+          <a:fontRef idx="minor">
+            <a:schemeClr val="dk1"/>
+          </a:fontRef>
+        </p:style>
+        <p:txBody>
+          <a:bodyPr rtlCol="0" anchor="ctr"/>
+          <a:lstStyle/>
+          <a:p>
+            <a:pPr algn="ctr"/>
+            <a:r>
+              <a:rPr lang="hu-HU" sz="1400" dirty="0" smtClean="0"/>
+              <a:t>Foo.java</a:t>
+            </a:r>
+            <a:endParaRPr lang="en-US" sz="1600" dirty="0"/>
+          </a:p>
+        </p:txBody>
+      </p:sp>
+      <p:sp>
+        <p:nvSpPr>
+          <p:cNvPr id="3" name="Rounded Rectangle 2"/>
+          <p:cNvSpPr/>
+          <p:nvPr/>
+        </p:nvSpPr>
+        <p:spPr>
+          <a:xfrm>
+            <a:off x="1880615" y="1472097"/>
+            <a:ext cx="1008112" cy="432048"/>
+          </a:xfrm>
+          <a:prstGeom prst="roundRect">
+            <a:avLst/>
+          </a:prstGeom>
+        </p:spPr>
+        <p:style>
+          <a:lnRef idx="2">
+            <a:schemeClr val="accent1"/>
+          </a:lnRef>
+          <a:fillRef idx="1">
+            <a:schemeClr val="lt1"/>
+          </a:fillRef>
+          <a:effectRef idx="0">
+            <a:schemeClr val="accent1"/>
+          </a:effectRef>
+          <a:fontRef idx="minor">
+            <a:schemeClr val="dk1"/>
+          </a:fontRef>
+        </p:style>
+        <p:txBody>
+          <a:bodyPr rtlCol="0" anchor="ctr"/>
+          <a:lstStyle/>
+          <a:p>
+            <a:pPr algn="ctr"/>
+            <a:r>
+              <a:rPr lang="hu-HU" sz="1400" dirty="0" smtClean="0"/>
+              <a:t>javac</a:t>
+            </a:r>
+            <a:endParaRPr lang="en-US" sz="1600" dirty="0"/>
+          </a:p>
+        </p:txBody>
+      </p:sp>
+      <p:sp>
+        <p:nvSpPr>
+          <p:cNvPr id="4" name="Snip Single Corner Rectangle 3"/>
+          <p:cNvSpPr/>
+          <p:nvPr/>
+        </p:nvSpPr>
+        <p:spPr>
+          <a:xfrm>
+            <a:off x="3429000" y="1004045"/>
+            <a:ext cx="1002754" cy="1368152"/>
+          </a:xfrm>
+          <a:prstGeom prst="snip1Rect">
+            <a:avLst/>
+          </a:prstGeom>
+        </p:spPr>
+        <p:style>
+          <a:lnRef idx="2">
+            <a:schemeClr val="accent1"/>
+          </a:lnRef>
+          <a:fillRef idx="1">
+            <a:schemeClr val="lt1"/>
+          </a:fillRef>
+          <a:effectRef idx="0">
+            <a:schemeClr val="accent1"/>
+          </a:effectRef>
+          <a:fontRef idx="minor">
+            <a:schemeClr val="dk1"/>
+          </a:fontRef>
+        </p:style>
+        <p:txBody>
+          <a:bodyPr rtlCol="0" anchor="ctr"/>
+          <a:lstStyle/>
+          <a:p>
+            <a:pPr algn="ctr"/>
+            <a:r>
+              <a:rPr lang="hu-HU" sz="1400" dirty="0" smtClean="0"/>
+              <a:t>Foo.class</a:t>
+            </a:r>
+            <a:endParaRPr lang="en-US" sz="1600" dirty="0"/>
+          </a:p>
+        </p:txBody>
+      </p:sp>
+      <p:sp>
+        <p:nvSpPr>
+          <p:cNvPr id="5" name="Rounded Rectangle 4"/>
+          <p:cNvSpPr/>
+          <p:nvPr/>
+        </p:nvSpPr>
+        <p:spPr>
+          <a:xfrm>
+            <a:off x="5095825" y="1472097"/>
+            <a:ext cx="1008112" cy="432048"/>
+          </a:xfrm>
+          <a:prstGeom prst="roundRect">
+            <a:avLst/>
+          </a:prstGeom>
+        </p:spPr>
+        <p:style>
+          <a:lnRef idx="2">
+            <a:schemeClr val="accent1"/>
+          </a:lnRef>
+          <a:fillRef idx="1">
+            <a:schemeClr val="lt1"/>
+          </a:fillRef>
+          <a:effectRef idx="0">
+            <a:schemeClr val="accent1"/>
+          </a:effectRef>
+          <a:fontRef idx="minor">
+            <a:schemeClr val="dk1"/>
+          </a:fontRef>
+        </p:style>
+        <p:txBody>
+          <a:bodyPr rtlCol="0" anchor="ctr"/>
+          <a:lstStyle/>
+          <a:p>
+            <a:pPr algn="ctr"/>
+            <a:r>
+              <a:rPr lang="hu-HU" sz="1400" dirty="0" smtClean="0"/>
+              <a:t>java</a:t>
+            </a:r>
+            <a:endParaRPr lang="en-US" sz="1600" dirty="0"/>
+          </a:p>
+        </p:txBody>
+      </p:sp>
+      <p:cxnSp>
+        <p:nvCxnSpPr>
+          <p:cNvPr id="7" name="Straight Arrow Connector 6"/>
+          <p:cNvCxnSpPr/>
+          <p:nvPr/>
+        </p:nvCxnSpPr>
+        <p:spPr>
+          <a:xfrm>
+            <a:off x="5301208" y="1004045"/>
+            <a:ext cx="0" cy="468052"/>
+          </a:xfrm>
+          <a:prstGeom prst="straightConnector1">
+            <a:avLst/>
+          </a:prstGeom>
+          <a:ln>
+            <a:tailEnd type="arrow"/>
+          </a:ln>
+        </p:spPr>
+        <p:style>
+          <a:lnRef idx="2">
+            <a:schemeClr val="accent1"/>
+          </a:lnRef>
+          <a:fillRef idx="0">
+            <a:schemeClr val="accent1"/>
+          </a:fillRef>
+          <a:effectRef idx="1">
+            <a:schemeClr val="accent1"/>
+          </a:effectRef>
+          <a:fontRef idx="minor">
+            <a:schemeClr val="tx1"/>
+          </a:fontRef>
+        </p:style>
+      </p:cxnSp>
+      <p:cxnSp>
+        <p:nvCxnSpPr>
+          <p:cNvPr id="8" name="Straight Arrow Connector 7"/>
+          <p:cNvCxnSpPr/>
+          <p:nvPr/>
+        </p:nvCxnSpPr>
+        <p:spPr>
+          <a:xfrm flipH="1">
+            <a:off x="5599882" y="1004045"/>
+            <a:ext cx="349398" cy="483729"/>
+          </a:xfrm>
+          <a:prstGeom prst="straightConnector1">
+            <a:avLst/>
+          </a:prstGeom>
+          <a:ln>
+            <a:tailEnd type="arrow"/>
+          </a:ln>
+        </p:spPr>
+        <p:style>
+          <a:lnRef idx="2">
+            <a:schemeClr val="accent1"/>
+          </a:lnRef>
+          <a:fillRef idx="0">
+            <a:schemeClr val="accent1"/>
+          </a:fillRef>
+          <a:effectRef idx="1">
+            <a:schemeClr val="accent1"/>
+          </a:effectRef>
+          <a:fontRef idx="minor">
+            <a:schemeClr val="tx1"/>
+          </a:fontRef>
+        </p:style>
+      </p:cxnSp>
+      <p:sp>
+        <p:nvSpPr>
+          <p:cNvPr id="10" name="TextBox 9"/>
+          <p:cNvSpPr txBox="1"/>
+          <p:nvPr/>
+        </p:nvSpPr>
+        <p:spPr>
+          <a:xfrm>
+            <a:off x="4951809" y="665491"/>
+            <a:ext cx="1357511" cy="338554"/>
+          </a:xfrm>
+          <a:prstGeom prst="rect">
+            <a:avLst/>
+          </a:prstGeom>
+          <a:noFill/>
+        </p:spPr>
+        <p:txBody>
+          <a:bodyPr wrap="square" rtlCol="0">
+            <a:spAutoFit/>
+          </a:bodyPr>
+          <a:lstStyle/>
+          <a:p>
+            <a:r>
+              <a:rPr lang="hu-HU" sz="1600" dirty="0" smtClean="0"/>
+              <a:t>Other classes</a:t>
+            </a:r>
+            <a:endParaRPr lang="en-US" sz="1600" dirty="0"/>
+          </a:p>
+        </p:txBody>
+      </p:sp>
+      <p:sp>
+        <p:nvSpPr>
+          <p:cNvPr id="14" name="Left Brace 13"/>
+          <p:cNvSpPr/>
+          <p:nvPr/>
+        </p:nvSpPr>
+        <p:spPr>
+          <a:xfrm rot="16200000">
+            <a:off x="1382675" y="1394507"/>
+            <a:ext cx="404664" cy="2679873"/>
+          </a:xfrm>
+          <a:prstGeom prst="leftBrace">
+            <a:avLst/>
+          </a:prstGeom>
+        </p:spPr>
+        <p:style>
+          <a:lnRef idx="2">
+            <a:schemeClr val="dk1"/>
+          </a:lnRef>
+          <a:fillRef idx="0">
+            <a:schemeClr val="dk1"/>
+          </a:fillRef>
+          <a:effectRef idx="1">
+            <a:schemeClr val="dk1"/>
+          </a:effectRef>
+          <a:fontRef idx="minor">
+            <a:schemeClr val="tx1"/>
+          </a:fontRef>
+        </p:style>
+        <p:txBody>
+          <a:bodyPr rtlCol="0" anchor="ctr"/>
+          <a:lstStyle/>
+          <a:p>
+            <a:pPr algn="ctr"/>
+            <a:endParaRPr lang="en-US"/>
+          </a:p>
+        </p:txBody>
+      </p:sp>
+      <p:sp>
+        <p:nvSpPr>
+          <p:cNvPr id="15" name="TextBox 14"/>
+          <p:cNvSpPr txBox="1"/>
+          <p:nvPr/>
+        </p:nvSpPr>
+        <p:spPr>
+          <a:xfrm>
+            <a:off x="245069" y="2861889"/>
+            <a:ext cx="2679875" cy="338554"/>
+          </a:xfrm>
+          <a:prstGeom prst="rect">
+            <a:avLst/>
+          </a:prstGeom>
+          <a:noFill/>
+        </p:spPr>
+        <p:txBody>
+          <a:bodyPr wrap="square" rtlCol="0">
+            <a:spAutoFit/>
+          </a:bodyPr>
+          <a:lstStyle/>
+          <a:p>
+            <a:pPr algn="ctr"/>
+            <a:r>
+              <a:rPr lang="hu-HU" sz="1600" dirty="0" smtClean="0"/>
+              <a:t>Java language</a:t>
+            </a:r>
+            <a:endParaRPr lang="en-US" sz="1600" dirty="0"/>
+          </a:p>
+        </p:txBody>
+      </p:sp>
+      <p:sp>
+        <p:nvSpPr>
+          <p:cNvPr id="16" name="Left Brace 15"/>
+          <p:cNvSpPr/>
+          <p:nvPr/>
+        </p:nvSpPr>
+        <p:spPr>
+          <a:xfrm rot="16200000">
+            <a:off x="4561669" y="1394507"/>
+            <a:ext cx="404664" cy="2679873"/>
+          </a:xfrm>
+          <a:prstGeom prst="leftBrace">
+            <a:avLst/>
+          </a:prstGeom>
+        </p:spPr>
+        <p:style>
+          <a:lnRef idx="2">
+            <a:schemeClr val="dk1"/>
+          </a:lnRef>
+          <a:fillRef idx="0">
+            <a:schemeClr val="dk1"/>
+          </a:fillRef>
+          <a:effectRef idx="1">
+            <a:schemeClr val="dk1"/>
+          </a:effectRef>
+          <a:fontRef idx="minor">
+            <a:schemeClr val="tx1"/>
+          </a:fontRef>
+        </p:style>
+        <p:txBody>
+          <a:bodyPr rtlCol="0" anchor="ctr"/>
+          <a:lstStyle/>
+          <a:p>
+            <a:pPr algn="ctr"/>
+            <a:endParaRPr lang="en-US"/>
+          </a:p>
+        </p:txBody>
+      </p:sp>
+      <p:sp>
+        <p:nvSpPr>
+          <p:cNvPr id="17" name="TextBox 16"/>
+          <p:cNvSpPr txBox="1"/>
+          <p:nvPr/>
+        </p:nvSpPr>
+        <p:spPr>
+          <a:xfrm>
+            <a:off x="3424063" y="2861889"/>
+            <a:ext cx="2679875" cy="338554"/>
+          </a:xfrm>
+          <a:prstGeom prst="rect">
+            <a:avLst/>
+          </a:prstGeom>
+          <a:noFill/>
+        </p:spPr>
+        <p:txBody>
+          <a:bodyPr wrap="square" rtlCol="0">
+            <a:spAutoFit/>
+          </a:bodyPr>
+          <a:lstStyle/>
+          <a:p>
+            <a:pPr algn="ctr"/>
+            <a:r>
+              <a:rPr lang="hu-HU" sz="1600" dirty="0" smtClean="0"/>
+              <a:t>Java Virtual Machine</a:t>
+            </a:r>
+            <a:endParaRPr lang="en-US" sz="1600" dirty="0"/>
+          </a:p>
+        </p:txBody>
+      </p:sp>
+      <p:cxnSp>
+        <p:nvCxnSpPr>
+          <p:cNvPr id="18" name="Straight Arrow Connector 17"/>
+          <p:cNvCxnSpPr>
+            <a:stCxn id="2" idx="0"/>
+            <a:endCxn id="3" idx="1"/>
+          </p:cNvCxnSpPr>
+          <p:nvPr/>
+        </p:nvCxnSpPr>
+        <p:spPr>
+          <a:xfrm>
+            <a:off x="1247824" y="1688121"/>
+            <a:ext cx="632791" cy="0"/>
+          </a:xfrm>
+          <a:prstGeom prst="straightConnector1">
+            <a:avLst/>
+          </a:prstGeom>
+          <a:ln>
+            <a:tailEnd type="arrow"/>
+          </a:ln>
+        </p:spPr>
+        <p:style>
+          <a:lnRef idx="2">
+            <a:schemeClr val="accent1"/>
+          </a:lnRef>
+          <a:fillRef idx="0">
+            <a:schemeClr val="accent1"/>
+          </a:fillRef>
+          <a:effectRef idx="1">
+            <a:schemeClr val="accent1"/>
+          </a:effectRef>
+          <a:fontRef idx="minor">
+            <a:schemeClr val="tx1"/>
+          </a:fontRef>
+        </p:style>
+      </p:cxnSp>
+      <p:cxnSp>
+        <p:nvCxnSpPr>
+          <p:cNvPr id="21" name="Straight Arrow Connector 20"/>
+          <p:cNvCxnSpPr>
+            <a:stCxn id="3" idx="3"/>
+            <a:endCxn id="4" idx="2"/>
+          </p:cNvCxnSpPr>
+          <p:nvPr/>
+        </p:nvCxnSpPr>
+        <p:spPr>
+          <a:xfrm>
+            <a:off x="2888727" y="1688121"/>
+            <a:ext cx="540273" cy="0"/>
+          </a:xfrm>
+          <a:prstGeom prst="straightConnector1">
+            <a:avLst/>
+          </a:prstGeom>
+          <a:ln>
+            <a:tailEnd type="arrow"/>
+          </a:ln>
+        </p:spPr>
+        <p:style>
+          <a:lnRef idx="2">
+            <a:schemeClr val="accent1"/>
+          </a:lnRef>
+          <a:fillRef idx="0">
+            <a:schemeClr val="accent1"/>
+          </a:fillRef>
+          <a:effectRef idx="1">
+            <a:schemeClr val="accent1"/>
+          </a:effectRef>
+          <a:fontRef idx="minor">
+            <a:schemeClr val="tx1"/>
+          </a:fontRef>
+        </p:style>
+      </p:cxnSp>
+      <p:cxnSp>
+        <p:nvCxnSpPr>
+          <p:cNvPr id="40" name="Elbow Connector 39"/>
+          <p:cNvCxnSpPr/>
+          <p:nvPr/>
+        </p:nvCxnSpPr>
+        <p:spPr>
+          <a:xfrm rot="16200000" flipH="1">
+            <a:off x="1069891" y="1012092"/>
+            <a:ext cx="170631" cy="159297"/>
+          </a:xfrm>
+          <a:prstGeom prst="bentConnector3">
+            <a:avLst>
+              <a:gd name="adj1" fmla="val 97449"/>
+            </a:avLst>
+          </a:prstGeom>
+        </p:spPr>
+        <p:style>
+          <a:lnRef idx="2">
+            <a:schemeClr val="accent1"/>
+          </a:lnRef>
+          <a:fillRef idx="0">
+            <a:schemeClr val="accent1"/>
+          </a:fillRef>
+          <a:effectRef idx="1">
+            <a:schemeClr val="accent1"/>
+          </a:effectRef>
+          <a:fontRef idx="minor">
+            <a:schemeClr val="tx1"/>
+          </a:fontRef>
+        </p:style>
+      </p:cxnSp>
+      <p:cxnSp>
+        <p:nvCxnSpPr>
+          <p:cNvPr id="23" name="Straight Arrow Connector 22"/>
+          <p:cNvCxnSpPr>
+            <a:stCxn id="4" idx="0"/>
+            <a:endCxn id="5" idx="1"/>
+          </p:cNvCxnSpPr>
+          <p:nvPr/>
+        </p:nvCxnSpPr>
+        <p:spPr>
+          <a:xfrm>
+            <a:off x="4431754" y="1688121"/>
+            <a:ext cx="664071" cy="0"/>
+          </a:xfrm>
+          <a:prstGeom prst="straightConnector1">
+            <a:avLst/>
+          </a:prstGeom>
+          <a:ln>
+            <a:tailEnd type="arrow"/>
+          </a:ln>
+        </p:spPr>
+        <p:style>
+          <a:lnRef idx="2">
+            <a:schemeClr val="accent1"/>
+          </a:lnRef>
+          <a:fillRef idx="0">
+            <a:schemeClr val="accent1"/>
+          </a:fillRef>
+          <a:effectRef idx="1">
+            <a:schemeClr val="accent1"/>
+          </a:effectRef>
+          <a:fontRef idx="minor">
+            <a:schemeClr val="tx1"/>
+          </a:fontRef>
+        </p:style>
+      </p:cxnSp>
+      <p:cxnSp>
+        <p:nvCxnSpPr>
+          <p:cNvPr id="44" name="Elbow Connector 43"/>
+          <p:cNvCxnSpPr/>
+          <p:nvPr/>
+        </p:nvCxnSpPr>
+        <p:spPr>
+          <a:xfrm rot="16200000" flipH="1">
+            <a:off x="4258777" y="1009191"/>
+            <a:ext cx="170631" cy="159297"/>
+          </a:xfrm>
+          <a:prstGeom prst="bentConnector3">
+            <a:avLst>
+              <a:gd name="adj1" fmla="val 97449"/>
+            </a:avLst>
+          </a:prstGeom>
+        </p:spPr>
+        <p:style>
+          <a:lnRef idx="2">
+            <a:schemeClr val="accent1"/>
+          </a:lnRef>
+          <a:fillRef idx="0">
+            <a:schemeClr val="accent1"/>
+          </a:fillRef>
+          <a:effectRef idx="1">
+            <a:schemeClr val="accent1"/>
+          </a:effectRef>
+          <a:fontRef idx="minor">
+            <a:schemeClr val="tx1"/>
+          </a:fontRef>
+        </p:style>
+      </p:cxnSp>
+    </p:spTree>
+    <p:extLst>
+      <p:ext uri="{BB962C8B-B14F-4D97-AF65-F5344CB8AC3E}">
+        <p14:creationId xmlns:p14="http://schemas.microsoft.com/office/powerpoint/2010/main" val="695761561"/>
+      </p:ext>
+    </p:extLst>
+  </p:cSld>
+  <p:clrMapOvr>
+    <a:masterClrMapping/>
+  </p:clrMapOvr>
+</p:sld>
+</file>
+
+<file path=ppt/slides/slide4.xml><?xml version="1.0" encoding="utf-8"?>
+<p:sld xmlns:a="http://schemas.openxmlformats.org/drawingml/2006/main" xmlns:r="http://schemas.openxmlformats.org/officeDocument/2006/relationships" xmlns:p="http://schemas.openxmlformats.org/presentationml/2006/main">
+  <p:cSld>
+    <p:spTree>
+      <p:nvGrpSpPr>
+        <p:cNvPr id="1" name=""/>
+        <p:cNvGrpSpPr/>
+        <p:nvPr/>
+      </p:nvGrpSpPr>
+      <p:grpSpPr>
+        <a:xfrm>
+          <a:off x="0" y="0"/>
+          <a:ext cx="0" cy="0"/>
+          <a:chOff x="0" y="0"/>
+          <a:chExt cx="0" cy="0"/>
+        </a:xfrm>
+      </p:grpSpPr>
+      <p:sp>
+        <p:nvSpPr>
+          <p:cNvPr id="2" name="Rectangle 1"/>
+          <p:cNvSpPr/>
+          <p:nvPr/>
+        </p:nvSpPr>
+        <p:spPr>
+          <a:xfrm>
+            <a:off x="260647" y="776536"/>
+            <a:ext cx="3157289" cy="864095"/>
+          </a:xfrm>
+          <a:prstGeom prst="rect">
+            <a:avLst/>
+          </a:prstGeom>
+        </p:spPr>
+        <p:style>
+          <a:lnRef idx="2">
+            <a:schemeClr val="accent1"/>
+          </a:lnRef>
+          <a:fillRef idx="1">
+            <a:schemeClr val="lt1"/>
+          </a:fillRef>
+          <a:effectRef idx="0">
+            <a:schemeClr val="accent1"/>
+          </a:effectRef>
+          <a:fontRef idx="minor">
+            <a:schemeClr val="dk1"/>
+          </a:fontRef>
+        </p:style>
+        <p:txBody>
+          <a:bodyPr rtlCol="0" anchor="ctr"/>
+          <a:lstStyle/>
+          <a:p>
+            <a:pPr algn="ctr"/>
+            <a:r>
+              <a:rPr lang="hu-HU" dirty="0" smtClean="0"/>
+              <a:t>Constant pool</a:t>
+            </a:r>
+            <a:endParaRPr lang="en-US" dirty="0"/>
+          </a:p>
+        </p:txBody>
+      </p:sp>
+      <p:sp>
+        <p:nvSpPr>
+          <p:cNvPr id="3" name="Rectangle 2"/>
+          <p:cNvSpPr/>
+          <p:nvPr/>
+        </p:nvSpPr>
+        <p:spPr>
+          <a:xfrm>
+            <a:off x="260648" y="416496"/>
+            <a:ext cx="3157289" cy="360040"/>
+          </a:xfrm>
+          <a:prstGeom prst="rect">
+            <a:avLst/>
+          </a:prstGeom>
+        </p:spPr>
+        <p:style>
+          <a:lnRef idx="2">
+            <a:schemeClr val="accent1"/>
+          </a:lnRef>
+          <a:fillRef idx="1">
+            <a:schemeClr val="lt1"/>
+          </a:fillRef>
+          <a:effectRef idx="0">
+            <a:schemeClr val="accent1"/>
+          </a:effectRef>
+          <a:fontRef idx="minor">
+            <a:schemeClr val="dk1"/>
+          </a:fontRef>
+        </p:style>
+        <p:txBody>
+          <a:bodyPr rtlCol="0" anchor="ctr"/>
+          <a:lstStyle/>
+          <a:p>
+            <a:pPr algn="ctr"/>
+            <a:r>
+              <a:rPr lang="hu-HU" dirty="0" smtClean="0"/>
+              <a:t>Header</a:t>
+            </a:r>
+            <a:endParaRPr lang="en-US" dirty="0"/>
+          </a:p>
+        </p:txBody>
+      </p:sp>
+      <p:sp>
+        <p:nvSpPr>
+          <p:cNvPr id="7" name="Rectangle 6"/>
+          <p:cNvSpPr/>
+          <p:nvPr/>
+        </p:nvSpPr>
+        <p:spPr>
+          <a:xfrm>
+            <a:off x="260646" y="1640631"/>
+            <a:ext cx="3157289" cy="360040"/>
+          </a:xfrm>
+          <a:prstGeom prst="rect">
+            <a:avLst/>
+          </a:prstGeom>
+        </p:spPr>
+        <p:style>
+          <a:lnRef idx="2">
+            <a:schemeClr val="accent1"/>
+          </a:lnRef>
+          <a:fillRef idx="1">
+            <a:schemeClr val="lt1"/>
+          </a:fillRef>
+          <a:effectRef idx="0">
+            <a:schemeClr val="accent1"/>
+          </a:effectRef>
+          <a:fontRef idx="minor">
+            <a:schemeClr val="dk1"/>
+          </a:fontRef>
+        </p:style>
+        <p:txBody>
+          <a:bodyPr rtlCol="0" anchor="ctr"/>
+          <a:lstStyle/>
+          <a:p>
+            <a:pPr algn="ctr"/>
+            <a:r>
+              <a:rPr lang="hu-HU" dirty="0" smtClean="0"/>
+              <a:t>Access rights</a:t>
+            </a:r>
+            <a:endParaRPr lang="en-US" dirty="0"/>
+          </a:p>
+        </p:txBody>
+      </p:sp>
+      <p:sp>
+        <p:nvSpPr>
+          <p:cNvPr id="8" name="Rectangle 7"/>
+          <p:cNvSpPr/>
+          <p:nvPr/>
+        </p:nvSpPr>
+        <p:spPr>
+          <a:xfrm>
+            <a:off x="260648" y="2000671"/>
+            <a:ext cx="3157289" cy="360040"/>
+          </a:xfrm>
+          <a:prstGeom prst="rect">
+            <a:avLst/>
+          </a:prstGeom>
+        </p:spPr>
+        <p:style>
+          <a:lnRef idx="2">
+            <a:schemeClr val="accent1"/>
+          </a:lnRef>
+          <a:fillRef idx="1">
+            <a:schemeClr val="lt1"/>
+          </a:fillRef>
+          <a:effectRef idx="0">
+            <a:schemeClr val="accent1"/>
+          </a:effectRef>
+          <a:fontRef idx="minor">
+            <a:schemeClr val="dk1"/>
+          </a:fontRef>
+        </p:style>
+        <p:txBody>
+          <a:bodyPr rtlCol="0" anchor="ctr"/>
+          <a:lstStyle/>
+          <a:p>
+            <a:pPr algn="ctr"/>
+            <a:r>
+              <a:rPr lang="hu-HU" dirty="0" smtClean="0"/>
+              <a:t>Implemented interfaces</a:t>
+            </a:r>
+            <a:endParaRPr lang="en-US" dirty="0"/>
+          </a:p>
+        </p:txBody>
+      </p:sp>
+      <p:sp>
+        <p:nvSpPr>
+          <p:cNvPr id="9" name="Rectangle 8"/>
+          <p:cNvSpPr/>
+          <p:nvPr/>
+        </p:nvSpPr>
+        <p:spPr>
+          <a:xfrm>
+            <a:off x="260645" y="2360711"/>
+            <a:ext cx="3157289" cy="360040"/>
+          </a:xfrm>
+          <a:prstGeom prst="rect">
+            <a:avLst/>
+          </a:prstGeom>
+        </p:spPr>
+        <p:style>
+          <a:lnRef idx="2">
+            <a:schemeClr val="accent1"/>
+          </a:lnRef>
+          <a:fillRef idx="1">
+            <a:schemeClr val="lt1"/>
+          </a:fillRef>
+          <a:effectRef idx="0">
+            <a:schemeClr val="accent1"/>
+          </a:effectRef>
+          <a:fontRef idx="minor">
+            <a:schemeClr val="dk1"/>
+          </a:fontRef>
+        </p:style>
+        <p:txBody>
+          <a:bodyPr rtlCol="0" anchor="ctr"/>
+          <a:lstStyle/>
+          <a:p>
+            <a:pPr algn="ctr"/>
+            <a:r>
+              <a:rPr lang="hu-HU" dirty="0" smtClean="0"/>
+              <a:t>Fields</a:t>
+            </a:r>
+            <a:endParaRPr lang="en-US" dirty="0"/>
+          </a:p>
+        </p:txBody>
+      </p:sp>
+      <p:sp>
+        <p:nvSpPr>
+          <p:cNvPr id="10" name="Rectangle 9"/>
+          <p:cNvSpPr/>
+          <p:nvPr/>
+        </p:nvSpPr>
+        <p:spPr>
+          <a:xfrm>
+            <a:off x="260644" y="2720751"/>
+            <a:ext cx="3157289" cy="360040"/>
+          </a:xfrm>
+          <a:prstGeom prst="rect">
+            <a:avLst/>
+          </a:prstGeom>
+        </p:spPr>
+        <p:style>
+          <a:lnRef idx="2">
+            <a:schemeClr val="accent1"/>
+          </a:lnRef>
+          <a:fillRef idx="1">
+            <a:schemeClr val="lt1"/>
+          </a:fillRef>
+          <a:effectRef idx="0">
+            <a:schemeClr val="accent1"/>
+          </a:effectRef>
+          <a:fontRef idx="minor">
+            <a:schemeClr val="dk1"/>
+          </a:fontRef>
+        </p:style>
+        <p:txBody>
+          <a:bodyPr rtlCol="0" anchor="ctr"/>
+          <a:lstStyle/>
+          <a:p>
+            <a:pPr algn="ctr"/>
+            <a:r>
+              <a:rPr lang="hu-HU" dirty="0" smtClean="0"/>
+              <a:t>Methods</a:t>
+            </a:r>
+            <a:endParaRPr lang="en-US" dirty="0"/>
+          </a:p>
+        </p:txBody>
+      </p:sp>
+      <p:sp>
+        <p:nvSpPr>
+          <p:cNvPr id="11" name="Rectangle 10"/>
+          <p:cNvSpPr/>
+          <p:nvPr/>
+        </p:nvSpPr>
+        <p:spPr>
+          <a:xfrm>
+            <a:off x="260643" y="3080791"/>
+            <a:ext cx="3157289" cy="360040"/>
+          </a:xfrm>
+          <a:prstGeom prst="rect">
+            <a:avLst/>
+          </a:prstGeom>
+        </p:spPr>
+        <p:style>
+          <a:lnRef idx="2">
+            <a:schemeClr val="accent1"/>
+          </a:lnRef>
+          <a:fillRef idx="1">
+            <a:schemeClr val="lt1"/>
+          </a:fillRef>
+          <a:effectRef idx="0">
+            <a:schemeClr val="accent1"/>
+          </a:effectRef>
+          <a:fontRef idx="minor">
+            <a:schemeClr val="dk1"/>
+          </a:fontRef>
+        </p:style>
+        <p:txBody>
+          <a:bodyPr rtlCol="0" anchor="ctr"/>
+          <a:lstStyle/>
+          <a:p>
+            <a:pPr algn="ctr"/>
+            <a:r>
+              <a:rPr lang="hu-HU" dirty="0" smtClean="0"/>
+              <a:t>Class attributes</a:t>
+            </a:r>
+            <a:endParaRPr lang="en-US" dirty="0"/>
+          </a:p>
+        </p:txBody>
+      </p:sp>
+    </p:spTree>
+    <p:extLst>
+      <p:ext uri="{BB962C8B-B14F-4D97-AF65-F5344CB8AC3E}">
+        <p14:creationId xmlns:p14="http://schemas.microsoft.com/office/powerpoint/2010/main" val="2360883287"/>
+      </p:ext>
+    </p:extLst>
+  </p:cSld>
+  <p:clrMapOvr>
+    <a:masterClrMapping/>
+  </p:clrMapOvr>
 </p:sld>
 </file>
 

</xml_diff>

<commit_message>
First outline for elaboration. Diagram for bc anal.
</commit_message>
<xml_diff>
--- a/incquery-deps-documentation/visio-diagrams/diagram-source.pptx
+++ b/incquery-deps-documentation/visio-diagrams/diagram-source.pptx
@@ -213,7 +213,7 @@
           <a:p>
             <a:fld id="{066D07CF-11C7-4B9C-BCBF-E2D9FCA17911}" type="datetimeFigureOut">
               <a:rPr lang="hu-HU" smtClean="0"/>
-              <a:t>2012.10.12.</a:t>
+              <a:t>2012.10.15.</a:t>
             </a:fld>
             <a:endParaRPr lang="hu-HU"/>
           </a:p>
@@ -746,7 +746,7 @@
           <a:p>
             <a:fld id="{109A3B03-3B51-4BDD-9DD7-3CEC69C24252}" type="datetimeFigureOut">
               <a:rPr lang="hu-HU" smtClean="0"/>
-              <a:t>2012.10.12.</a:t>
+              <a:t>2012.10.15.</a:t>
             </a:fld>
             <a:endParaRPr lang="hu-HU"/>
           </a:p>
@@ -916,7 +916,7 @@
           <a:p>
             <a:fld id="{109A3B03-3B51-4BDD-9DD7-3CEC69C24252}" type="datetimeFigureOut">
               <a:rPr lang="hu-HU" smtClean="0"/>
-              <a:t>2012.10.12.</a:t>
+              <a:t>2012.10.15.</a:t>
             </a:fld>
             <a:endParaRPr lang="hu-HU"/>
           </a:p>
@@ -1096,7 +1096,7 @@
           <a:p>
             <a:fld id="{109A3B03-3B51-4BDD-9DD7-3CEC69C24252}" type="datetimeFigureOut">
               <a:rPr lang="hu-HU" smtClean="0"/>
-              <a:t>2012.10.12.</a:t>
+              <a:t>2012.10.15.</a:t>
             </a:fld>
             <a:endParaRPr lang="hu-HU"/>
           </a:p>
@@ -1266,7 +1266,7 @@
           <a:p>
             <a:fld id="{109A3B03-3B51-4BDD-9DD7-3CEC69C24252}" type="datetimeFigureOut">
               <a:rPr lang="hu-HU" smtClean="0"/>
-              <a:t>2012.10.12.</a:t>
+              <a:t>2012.10.15.</a:t>
             </a:fld>
             <a:endParaRPr lang="hu-HU"/>
           </a:p>
@@ -1512,7 +1512,7 @@
           <a:p>
             <a:fld id="{109A3B03-3B51-4BDD-9DD7-3CEC69C24252}" type="datetimeFigureOut">
               <a:rPr lang="hu-HU" smtClean="0"/>
-              <a:t>2012.10.12.</a:t>
+              <a:t>2012.10.15.</a:t>
             </a:fld>
             <a:endParaRPr lang="hu-HU"/>
           </a:p>
@@ -1800,7 +1800,7 @@
           <a:p>
             <a:fld id="{109A3B03-3B51-4BDD-9DD7-3CEC69C24252}" type="datetimeFigureOut">
               <a:rPr lang="hu-HU" smtClean="0"/>
-              <a:t>2012.10.12.</a:t>
+              <a:t>2012.10.15.</a:t>
             </a:fld>
             <a:endParaRPr lang="hu-HU"/>
           </a:p>
@@ -2222,7 +2222,7 @@
           <a:p>
             <a:fld id="{109A3B03-3B51-4BDD-9DD7-3CEC69C24252}" type="datetimeFigureOut">
               <a:rPr lang="hu-HU" smtClean="0"/>
-              <a:t>2012.10.12.</a:t>
+              <a:t>2012.10.15.</a:t>
             </a:fld>
             <a:endParaRPr lang="hu-HU"/>
           </a:p>
@@ -2340,7 +2340,7 @@
           <a:p>
             <a:fld id="{109A3B03-3B51-4BDD-9DD7-3CEC69C24252}" type="datetimeFigureOut">
               <a:rPr lang="hu-HU" smtClean="0"/>
-              <a:t>2012.10.12.</a:t>
+              <a:t>2012.10.15.</a:t>
             </a:fld>
             <a:endParaRPr lang="hu-HU"/>
           </a:p>
@@ -2435,7 +2435,7 @@
           <a:p>
             <a:fld id="{109A3B03-3B51-4BDD-9DD7-3CEC69C24252}" type="datetimeFigureOut">
               <a:rPr lang="hu-HU" smtClean="0"/>
-              <a:t>2012.10.12.</a:t>
+              <a:t>2012.10.15.</a:t>
             </a:fld>
             <a:endParaRPr lang="hu-HU"/>
           </a:p>
@@ -2712,7 +2712,7 @@
           <a:p>
             <a:fld id="{109A3B03-3B51-4BDD-9DD7-3CEC69C24252}" type="datetimeFigureOut">
               <a:rPr lang="hu-HU" smtClean="0"/>
-              <a:t>2012.10.12.</a:t>
+              <a:t>2012.10.15.</a:t>
             </a:fld>
             <a:endParaRPr lang="hu-HU"/>
           </a:p>
@@ -2965,7 +2965,7 @@
           <a:p>
             <a:fld id="{109A3B03-3B51-4BDD-9DD7-3CEC69C24252}" type="datetimeFigureOut">
               <a:rPr lang="hu-HU" smtClean="0"/>
-              <a:t>2012.10.12.</a:t>
+              <a:t>2012.10.15.</a:t>
             </a:fld>
             <a:endParaRPr lang="hu-HU"/>
           </a:p>
@@ -3178,7 +3178,7 @@
           <a:p>
             <a:fld id="{109A3B03-3B51-4BDD-9DD7-3CEC69C24252}" type="datetimeFigureOut">
               <a:rPr lang="hu-HU" smtClean="0"/>
-              <a:t>2012.10.12.</a:t>
+              <a:t>2012.10.15.</a:t>
             </a:fld>
             <a:endParaRPr lang="hu-HU"/>
           </a:p>
@@ -4501,24 +4501,24 @@
           <a:p>
             <a:pPr algn="ctr"/>
             <a:r>
-              <a:rPr lang="en-US" smtClean="0"/>
+              <a:rPr lang="en-US" dirty="0" smtClean="0"/>
               <a:t>Byte</a:t>
             </a:r>
           </a:p>
           <a:p>
             <a:pPr algn="ctr"/>
             <a:r>
-              <a:rPr lang="en-US" smtClean="0"/>
+              <a:rPr lang="en-US" dirty="0" smtClean="0"/>
               <a:t>code</a:t>
             </a:r>
           </a:p>
           <a:p>
             <a:pPr algn="ctr"/>
             <a:r>
-              <a:rPr lang="en-US" smtClean="0"/>
-              <a:t>analysis</a:t>
-            </a:r>
-            <a:endParaRPr lang="en-US"/>
+              <a:rPr lang="en-US" dirty="0" smtClean="0"/>
+              <a:t>analyzer</a:t>
+            </a:r>
+            <a:endParaRPr lang="en-US" dirty="0"/>
           </a:p>
         </p:txBody>
       </p:sp>
@@ -5181,7 +5181,7 @@
           <a:p>
             <a:pPr algn="ctr"/>
             <a:r>
-              <a:rPr lang="hu-HU" dirty="0" err="1" smtClean="0">
+              <a:rPr lang="hu-HU" dirty="0" smtClean="0">
                 <a:solidFill>
                   <a:schemeClr val="tx2"/>
                 </a:solidFill>
@@ -5197,12 +5197,12 @@
               <a:t> </a:t>
             </a:r>
             <a:r>
-              <a:rPr lang="hu-HU" dirty="0" err="1" smtClean="0">
+              <a:rPr lang="hu-HU" dirty="0" smtClean="0">
                 <a:solidFill>
                   <a:schemeClr val="tx2"/>
                 </a:solidFill>
               </a:rPr>
-              <a:t>plug-in</a:t>
+              <a:t>plugin</a:t>
             </a:r>
             <a:endParaRPr lang="en-US" dirty="0">
               <a:solidFill>

</xml_diff>

<commit_message>
Dependency processor section done.
</commit_message>
<xml_diff>
--- a/incquery-deps-documentation/visio-diagrams/diagram-source.pptx
+++ b/incquery-deps-documentation/visio-diagrams/diagram-source.pptx
@@ -1060,10 +1060,24 @@
     <dgm:pt modelId="{4937E544-948D-47AE-9997-07F401BE281A}" type="pres">
       <dgm:prSet presAssocID="{12DE9912-F042-414E-B3B6-FBC124BD5B25}" presName="sibTrans" presStyleLbl="sibTrans2D1" presStyleIdx="0" presStyleCnt="3"/>
       <dgm:spPr/>
+      <dgm:t>
+        <a:bodyPr/>
+        <a:lstStyle/>
+        <a:p>
+          <a:endParaRPr lang="en-US"/>
+        </a:p>
+      </dgm:t>
     </dgm:pt>
     <dgm:pt modelId="{622038D5-8748-48DD-A25A-D0AF25586C10}" type="pres">
       <dgm:prSet presAssocID="{12DE9912-F042-414E-B3B6-FBC124BD5B25}" presName="connectorText" presStyleLbl="sibTrans2D1" presStyleIdx="0" presStyleCnt="3"/>
       <dgm:spPr/>
+      <dgm:t>
+        <a:bodyPr/>
+        <a:lstStyle/>
+        <a:p>
+          <a:endParaRPr lang="en-US"/>
+        </a:p>
+      </dgm:t>
     </dgm:pt>
     <dgm:pt modelId="{C9C215A8-D6FE-4ACB-B0FD-FE11CBAD2AC5}" type="pres">
       <dgm:prSet presAssocID="{F0F2769A-1199-48DE-9B22-CCB6010A3335}" presName="node" presStyleLbl="node1" presStyleIdx="1" presStyleCnt="4">
@@ -1083,10 +1097,24 @@
     <dgm:pt modelId="{DF764472-6458-4F89-A300-EA3415E4EE16}" type="pres">
       <dgm:prSet presAssocID="{3A7FBFD5-C68E-4BFB-B00D-9581F32F2774}" presName="sibTrans" presStyleLbl="sibTrans2D1" presStyleIdx="1" presStyleCnt="3"/>
       <dgm:spPr/>
+      <dgm:t>
+        <a:bodyPr/>
+        <a:lstStyle/>
+        <a:p>
+          <a:endParaRPr lang="en-US"/>
+        </a:p>
+      </dgm:t>
     </dgm:pt>
     <dgm:pt modelId="{8D47B5A0-A41F-4ADC-8730-561B3C2419BC}" type="pres">
       <dgm:prSet presAssocID="{3A7FBFD5-C68E-4BFB-B00D-9581F32F2774}" presName="connectorText" presStyleLbl="sibTrans2D1" presStyleIdx="1" presStyleCnt="3"/>
       <dgm:spPr/>
+      <dgm:t>
+        <a:bodyPr/>
+        <a:lstStyle/>
+        <a:p>
+          <a:endParaRPr lang="en-US"/>
+        </a:p>
+      </dgm:t>
     </dgm:pt>
     <dgm:pt modelId="{34F7957B-662E-46F9-8C13-AAA64418E827}" type="pres">
       <dgm:prSet presAssocID="{DDB85ACD-860F-4F26-9C19-BF38892C7BEA}" presName="node" presStyleLbl="node1" presStyleIdx="2" presStyleCnt="4">
@@ -1106,10 +1134,24 @@
     <dgm:pt modelId="{5DE24C01-3619-4BAC-9468-EFD0DECDAEBE}" type="pres">
       <dgm:prSet presAssocID="{DE19FD3A-FEDA-4520-83A1-2BD07D8316B3}" presName="sibTrans" presStyleLbl="sibTrans2D1" presStyleIdx="2" presStyleCnt="3"/>
       <dgm:spPr/>
+      <dgm:t>
+        <a:bodyPr/>
+        <a:lstStyle/>
+        <a:p>
+          <a:endParaRPr lang="en-US"/>
+        </a:p>
+      </dgm:t>
     </dgm:pt>
     <dgm:pt modelId="{FCCAC406-000E-4BB6-9C34-BD0B3882E050}" type="pres">
       <dgm:prSet presAssocID="{DE19FD3A-FEDA-4520-83A1-2BD07D8316B3}" presName="connectorText" presStyleLbl="sibTrans2D1" presStyleIdx="2" presStyleCnt="3"/>
       <dgm:spPr/>
+      <dgm:t>
+        <a:bodyPr/>
+        <a:lstStyle/>
+        <a:p>
+          <a:endParaRPr lang="en-US"/>
+        </a:p>
+      </dgm:t>
     </dgm:pt>
     <dgm:pt modelId="{D71C472C-06E1-4BBA-91FF-4B5D3CC75F1F}" type="pres">
       <dgm:prSet presAssocID="{113A74AF-7986-4E7F-A07B-0B9AE1A741D2}" presName="node" presStyleLbl="node1" presStyleIdx="3" presStyleCnt="4">
@@ -1128,21 +1170,21 @@
     </dgm:pt>
   </dgm:ptLst>
   <dgm:cxnLst>
+    <dgm:cxn modelId="{4CB207AA-7CE2-4C8D-BF1A-CFF78D019437}" type="presOf" srcId="{12DE9912-F042-414E-B3B6-FBC124BD5B25}" destId="{4937E544-948D-47AE-9997-07F401BE281A}" srcOrd="0" destOrd="0" presId="urn:microsoft.com/office/officeart/2005/8/layout/process1"/>
     <dgm:cxn modelId="{D322BC26-6868-4CB2-B1C3-7F39B2D1BBC3}" type="presOf" srcId="{113A74AF-7986-4E7F-A07B-0B9AE1A741D2}" destId="{D71C472C-06E1-4BBA-91FF-4B5D3CC75F1F}" srcOrd="0" destOrd="0" presId="urn:microsoft.com/office/officeart/2005/8/layout/process1"/>
-    <dgm:cxn modelId="{948C39D5-A445-4728-9B06-85113EDEEF63}" type="presOf" srcId="{F0F2769A-1199-48DE-9B22-CCB6010A3335}" destId="{C9C215A8-D6FE-4ACB-B0FD-FE11CBAD2AC5}" srcOrd="0" destOrd="0" presId="urn:microsoft.com/office/officeart/2005/8/layout/process1"/>
+    <dgm:cxn modelId="{0BE37BCB-1EF8-40B1-8855-42CB35B3C5C8}" srcId="{CD39A5D4-7659-45A0-A345-2EAD4309D481}" destId="{90EB03C9-FC94-491F-B79B-3030822DA883}" srcOrd="0" destOrd="0" parTransId="{49F4B4A9-929B-4DDE-8182-1F7F5120C6E5}" sibTransId="{12DE9912-F042-414E-B3B6-FBC124BD5B25}"/>
+    <dgm:cxn modelId="{DB50C269-D666-474F-9546-0C2DAA292696}" srcId="{CD39A5D4-7659-45A0-A345-2EAD4309D481}" destId="{DDB85ACD-860F-4F26-9C19-BF38892C7BEA}" srcOrd="2" destOrd="0" parTransId="{82762091-53F2-49C0-9F4E-A1BE687DAC6F}" sibTransId="{DE19FD3A-FEDA-4520-83A1-2BD07D8316B3}"/>
+    <dgm:cxn modelId="{723904B8-5D06-499D-8CD7-258D366331BE}" type="presOf" srcId="{12DE9912-F042-414E-B3B6-FBC124BD5B25}" destId="{622038D5-8748-48DD-A25A-D0AF25586C10}" srcOrd="1" destOrd="0" presId="urn:microsoft.com/office/officeart/2005/8/layout/process1"/>
+    <dgm:cxn modelId="{0641983B-C181-47DC-92B8-E3E83CEAE4F8}" type="presOf" srcId="{3A7FBFD5-C68E-4BFB-B00D-9581F32F2774}" destId="{DF764472-6458-4F89-A300-EA3415E4EE16}" srcOrd="0" destOrd="0" presId="urn:microsoft.com/office/officeart/2005/8/layout/process1"/>
+    <dgm:cxn modelId="{F50132D9-705F-4FFB-9ABE-DC0748E02C37}" type="presOf" srcId="{DE19FD3A-FEDA-4520-83A1-2BD07D8316B3}" destId="{FCCAC406-000E-4BB6-9C34-BD0B3882E050}" srcOrd="1" destOrd="0" presId="urn:microsoft.com/office/officeart/2005/8/layout/process1"/>
+    <dgm:cxn modelId="{B762F8F5-5680-4AFC-A1A3-03D6189399C6}" srcId="{CD39A5D4-7659-45A0-A345-2EAD4309D481}" destId="{F0F2769A-1199-48DE-9B22-CCB6010A3335}" srcOrd="1" destOrd="0" parTransId="{0461A3D4-01D1-4CD4-8434-5719646FD663}" sibTransId="{3A7FBFD5-C68E-4BFB-B00D-9581F32F2774}"/>
     <dgm:cxn modelId="{D8FAF011-9906-479F-861E-B2E51BD2AFC5}" type="presOf" srcId="{DDB85ACD-860F-4F26-9C19-BF38892C7BEA}" destId="{34F7957B-662E-46F9-8C13-AAA64418E827}" srcOrd="0" destOrd="0" presId="urn:microsoft.com/office/officeart/2005/8/layout/process1"/>
-    <dgm:cxn modelId="{F50132D9-705F-4FFB-9ABE-DC0748E02C37}" type="presOf" srcId="{DE19FD3A-FEDA-4520-83A1-2BD07D8316B3}" destId="{FCCAC406-000E-4BB6-9C34-BD0B3882E050}" srcOrd="1" destOrd="0" presId="urn:microsoft.com/office/officeart/2005/8/layout/process1"/>
-    <dgm:cxn modelId="{723904B8-5D06-499D-8CD7-258D366331BE}" type="presOf" srcId="{12DE9912-F042-414E-B3B6-FBC124BD5B25}" destId="{622038D5-8748-48DD-A25A-D0AF25586C10}" srcOrd="1" destOrd="0" presId="urn:microsoft.com/office/officeart/2005/8/layout/process1"/>
-    <dgm:cxn modelId="{829486BC-BA59-45B1-86D1-3080DBD9A509}" type="presOf" srcId="{DE19FD3A-FEDA-4520-83A1-2BD07D8316B3}" destId="{5DE24C01-3619-4BAC-9468-EFD0DECDAEBE}" srcOrd="0" destOrd="0" presId="urn:microsoft.com/office/officeart/2005/8/layout/process1"/>
     <dgm:cxn modelId="{97522110-C6FD-443B-A02E-95820FD164C2}" type="presOf" srcId="{CD39A5D4-7659-45A0-A345-2EAD4309D481}" destId="{31847001-EB12-440A-AAF9-CB4F3F197E1A}" srcOrd="0" destOrd="0" presId="urn:microsoft.com/office/officeart/2005/8/layout/process1"/>
     <dgm:cxn modelId="{C4825851-F946-4EA1-85A6-47529D8079EA}" type="presOf" srcId="{3A7FBFD5-C68E-4BFB-B00D-9581F32F2774}" destId="{8D47B5A0-A41F-4ADC-8730-561B3C2419BC}" srcOrd="1" destOrd="0" presId="urn:microsoft.com/office/officeart/2005/8/layout/process1"/>
-    <dgm:cxn modelId="{0BE37BCB-1EF8-40B1-8855-42CB35B3C5C8}" srcId="{CD39A5D4-7659-45A0-A345-2EAD4309D481}" destId="{90EB03C9-FC94-491F-B79B-3030822DA883}" srcOrd="0" destOrd="0" parTransId="{49F4B4A9-929B-4DDE-8182-1F7F5120C6E5}" sibTransId="{12DE9912-F042-414E-B3B6-FBC124BD5B25}"/>
-    <dgm:cxn modelId="{0641983B-C181-47DC-92B8-E3E83CEAE4F8}" type="presOf" srcId="{3A7FBFD5-C68E-4BFB-B00D-9581F32F2774}" destId="{DF764472-6458-4F89-A300-EA3415E4EE16}" srcOrd="0" destOrd="0" presId="urn:microsoft.com/office/officeart/2005/8/layout/process1"/>
+    <dgm:cxn modelId="{F4DFD9E5-A2FF-4628-82CD-3891978397D9}" type="presOf" srcId="{90EB03C9-FC94-491F-B79B-3030822DA883}" destId="{9B596910-61E9-4C36-BFF7-8D4A75ED0A91}" srcOrd="0" destOrd="0" presId="urn:microsoft.com/office/officeart/2005/8/layout/process1"/>
     <dgm:cxn modelId="{7E8375E8-6BE8-4D57-805A-5DE7D75D3E6C}" srcId="{CD39A5D4-7659-45A0-A345-2EAD4309D481}" destId="{113A74AF-7986-4E7F-A07B-0B9AE1A741D2}" srcOrd="3" destOrd="0" parTransId="{C3826192-672D-4BFD-8D7E-E0E3252A4AC9}" sibTransId="{0F5A0701-4A89-4D3F-8E0C-B08A9E8E03B5}"/>
-    <dgm:cxn modelId="{DB50C269-D666-474F-9546-0C2DAA292696}" srcId="{CD39A5D4-7659-45A0-A345-2EAD4309D481}" destId="{DDB85ACD-860F-4F26-9C19-BF38892C7BEA}" srcOrd="2" destOrd="0" parTransId="{82762091-53F2-49C0-9F4E-A1BE687DAC6F}" sibTransId="{DE19FD3A-FEDA-4520-83A1-2BD07D8316B3}"/>
-    <dgm:cxn modelId="{F4DFD9E5-A2FF-4628-82CD-3891978397D9}" type="presOf" srcId="{90EB03C9-FC94-491F-B79B-3030822DA883}" destId="{9B596910-61E9-4C36-BFF7-8D4A75ED0A91}" srcOrd="0" destOrd="0" presId="urn:microsoft.com/office/officeart/2005/8/layout/process1"/>
-    <dgm:cxn modelId="{B762F8F5-5680-4AFC-A1A3-03D6189399C6}" srcId="{CD39A5D4-7659-45A0-A345-2EAD4309D481}" destId="{F0F2769A-1199-48DE-9B22-CCB6010A3335}" srcOrd="1" destOrd="0" parTransId="{0461A3D4-01D1-4CD4-8434-5719646FD663}" sibTransId="{3A7FBFD5-C68E-4BFB-B00D-9581F32F2774}"/>
-    <dgm:cxn modelId="{4CB207AA-7CE2-4C8D-BF1A-CFF78D019437}" type="presOf" srcId="{12DE9912-F042-414E-B3B6-FBC124BD5B25}" destId="{4937E544-948D-47AE-9997-07F401BE281A}" srcOrd="0" destOrd="0" presId="urn:microsoft.com/office/officeart/2005/8/layout/process1"/>
+    <dgm:cxn modelId="{829486BC-BA59-45B1-86D1-3080DBD9A509}" type="presOf" srcId="{DE19FD3A-FEDA-4520-83A1-2BD07D8316B3}" destId="{5DE24C01-3619-4BAC-9468-EFD0DECDAEBE}" srcOrd="0" destOrd="0" presId="urn:microsoft.com/office/officeart/2005/8/layout/process1"/>
+    <dgm:cxn modelId="{948C39D5-A445-4728-9B06-85113EDEEF63}" type="presOf" srcId="{F0F2769A-1199-48DE-9B22-CCB6010A3335}" destId="{C9C215A8-D6FE-4ACB-B0FD-FE11CBAD2AC5}" srcOrd="0" destOrd="0" presId="urn:microsoft.com/office/officeart/2005/8/layout/process1"/>
     <dgm:cxn modelId="{D8FA7B4B-E436-4BF8-937D-E292BA9CCBB3}" type="presParOf" srcId="{31847001-EB12-440A-AAF9-CB4F3F197E1A}" destId="{9B596910-61E9-4C36-BFF7-8D4A75ED0A91}" srcOrd="0" destOrd="0" presId="urn:microsoft.com/office/officeart/2005/8/layout/process1"/>
     <dgm:cxn modelId="{427651B8-6A8B-4399-A56B-9E35883E506C}" type="presParOf" srcId="{31847001-EB12-440A-AAF9-CB4F3F197E1A}" destId="{4937E544-948D-47AE-9997-07F401BE281A}" srcOrd="1" destOrd="0" presId="urn:microsoft.com/office/officeart/2005/8/layout/process1"/>
     <dgm:cxn modelId="{E958C3FE-43AD-4028-8981-E73145E8F708}" type="presParOf" srcId="{4937E544-948D-47AE-9997-07F401BE281A}" destId="{622038D5-8748-48DD-A25A-D0AF25586C10}" srcOrd="0" destOrd="0" presId="urn:microsoft.com/office/officeart/2005/8/layout/process1"/>
@@ -2964,7 +3006,7 @@
           <a:p>
             <a:fld id="{066D07CF-11C7-4B9C-BCBF-E2D9FCA17911}" type="datetimeFigureOut">
               <a:rPr lang="hu-HU" smtClean="0"/>
-              <a:t>2012.10.16.</a:t>
+              <a:t>2012.10.18.</a:t>
             </a:fld>
             <a:endParaRPr lang="hu-HU"/>
           </a:p>
@@ -3507,7 +3549,7 @@
           <a:p>
             <a:fld id="{109A3B03-3B51-4BDD-9DD7-3CEC69C24252}" type="datetimeFigureOut">
               <a:rPr lang="hu-HU" smtClean="0"/>
-              <a:t>2012.10.16.</a:t>
+              <a:t>2012.10.18.</a:t>
             </a:fld>
             <a:endParaRPr lang="hu-HU"/>
           </a:p>
@@ -3677,7 +3719,7 @@
           <a:p>
             <a:fld id="{109A3B03-3B51-4BDD-9DD7-3CEC69C24252}" type="datetimeFigureOut">
               <a:rPr lang="hu-HU" smtClean="0"/>
-              <a:t>2012.10.16.</a:t>
+              <a:t>2012.10.18.</a:t>
             </a:fld>
             <a:endParaRPr lang="hu-HU"/>
           </a:p>
@@ -3857,7 +3899,7 @@
           <a:p>
             <a:fld id="{109A3B03-3B51-4BDD-9DD7-3CEC69C24252}" type="datetimeFigureOut">
               <a:rPr lang="hu-HU" smtClean="0"/>
-              <a:t>2012.10.16.</a:t>
+              <a:t>2012.10.18.</a:t>
             </a:fld>
             <a:endParaRPr lang="hu-HU"/>
           </a:p>
@@ -4027,7 +4069,7 @@
           <a:p>
             <a:fld id="{109A3B03-3B51-4BDD-9DD7-3CEC69C24252}" type="datetimeFigureOut">
               <a:rPr lang="hu-HU" smtClean="0"/>
-              <a:t>2012.10.16.</a:t>
+              <a:t>2012.10.18.</a:t>
             </a:fld>
             <a:endParaRPr lang="hu-HU"/>
           </a:p>
@@ -4273,7 +4315,7 @@
           <a:p>
             <a:fld id="{109A3B03-3B51-4BDD-9DD7-3CEC69C24252}" type="datetimeFigureOut">
               <a:rPr lang="hu-HU" smtClean="0"/>
-              <a:t>2012.10.16.</a:t>
+              <a:t>2012.10.18.</a:t>
             </a:fld>
             <a:endParaRPr lang="hu-HU"/>
           </a:p>
@@ -4561,7 +4603,7 @@
           <a:p>
             <a:fld id="{109A3B03-3B51-4BDD-9DD7-3CEC69C24252}" type="datetimeFigureOut">
               <a:rPr lang="hu-HU" smtClean="0"/>
-              <a:t>2012.10.16.</a:t>
+              <a:t>2012.10.18.</a:t>
             </a:fld>
             <a:endParaRPr lang="hu-HU"/>
           </a:p>
@@ -4983,7 +5025,7 @@
           <a:p>
             <a:fld id="{109A3B03-3B51-4BDD-9DD7-3CEC69C24252}" type="datetimeFigureOut">
               <a:rPr lang="hu-HU" smtClean="0"/>
-              <a:t>2012.10.16.</a:t>
+              <a:t>2012.10.18.</a:t>
             </a:fld>
             <a:endParaRPr lang="hu-HU"/>
           </a:p>
@@ -5101,7 +5143,7 @@
           <a:p>
             <a:fld id="{109A3B03-3B51-4BDD-9DD7-3CEC69C24252}" type="datetimeFigureOut">
               <a:rPr lang="hu-HU" smtClean="0"/>
-              <a:t>2012.10.16.</a:t>
+              <a:t>2012.10.18.</a:t>
             </a:fld>
             <a:endParaRPr lang="hu-HU"/>
           </a:p>
@@ -5196,7 +5238,7 @@
           <a:p>
             <a:fld id="{109A3B03-3B51-4BDD-9DD7-3CEC69C24252}" type="datetimeFigureOut">
               <a:rPr lang="hu-HU" smtClean="0"/>
-              <a:t>2012.10.16.</a:t>
+              <a:t>2012.10.18.</a:t>
             </a:fld>
             <a:endParaRPr lang="hu-HU"/>
           </a:p>
@@ -5473,7 +5515,7 @@
           <a:p>
             <a:fld id="{109A3B03-3B51-4BDD-9DD7-3CEC69C24252}" type="datetimeFigureOut">
               <a:rPr lang="hu-HU" smtClean="0"/>
-              <a:t>2012.10.16.</a:t>
+              <a:t>2012.10.18.</a:t>
             </a:fld>
             <a:endParaRPr lang="hu-HU"/>
           </a:p>
@@ -5726,7 +5768,7 @@
           <a:p>
             <a:fld id="{109A3B03-3B51-4BDD-9DD7-3CEC69C24252}" type="datetimeFigureOut">
               <a:rPr lang="hu-HU" smtClean="0"/>
-              <a:t>2012.10.16.</a:t>
+              <a:t>2012.10.18.</a:t>
             </a:fld>
             <a:endParaRPr lang="hu-HU"/>
           </a:p>
@@ -5939,7 +5981,7 @@
           <a:p>
             <a:fld id="{109A3B03-3B51-4BDD-9DD7-3CEC69C24252}" type="datetimeFigureOut">
               <a:rPr lang="hu-HU" smtClean="0"/>
-              <a:t>2012.10.16.</a:t>
+              <a:t>2012.10.18.</a:t>
             </a:fld>
             <a:endParaRPr lang="hu-HU"/>
           </a:p>
@@ -6316,13 +6358,51 @@
       </p:grpSpPr>
       <p:sp>
         <p:nvSpPr>
+          <p:cNvPr id="11" name="Téglalap 10"/>
+          <p:cNvSpPr/>
+          <p:nvPr/>
+        </p:nvSpPr>
+        <p:spPr>
+          <a:xfrm>
+            <a:off x="1844824" y="56455"/>
+            <a:ext cx="4896544" cy="4284186"/>
+          </a:xfrm>
+          <a:prstGeom prst="rect">
+            <a:avLst/>
+          </a:prstGeom>
+        </p:spPr>
+        <p:style>
+          <a:lnRef idx="1">
+            <a:schemeClr val="accent3"/>
+          </a:lnRef>
+          <a:fillRef idx="3">
+            <a:schemeClr val="accent3"/>
+          </a:fillRef>
+          <a:effectRef idx="2">
+            <a:schemeClr val="accent3"/>
+          </a:effectRef>
+          <a:fontRef idx="minor">
+            <a:schemeClr val="lt1"/>
+          </a:fontRef>
+        </p:style>
+        <p:txBody>
+          <a:bodyPr rtlCol="0" anchor="ctr"/>
+          <a:lstStyle/>
+          <a:p>
+            <a:pPr algn="ctr"/>
+            <a:endParaRPr lang="en-US"/>
+          </a:p>
+        </p:txBody>
+      </p:sp>
+      <p:sp>
+        <p:nvSpPr>
           <p:cNvPr id="10" name="Téglalap 9"/>
           <p:cNvSpPr/>
           <p:nvPr/>
         </p:nvSpPr>
         <p:spPr>
           <a:xfrm>
-            <a:off x="1869457" y="3254003"/>
+            <a:off x="1859932" y="3254003"/>
             <a:ext cx="153291" cy="153291"/>
           </a:xfrm>
           <a:prstGeom prst="rect">
@@ -6351,84 +6431,6 @@
           <a:p>
             <a:pPr algn="ctr"/>
             <a:endParaRPr lang="en-US" b="1"/>
-          </a:p>
-        </p:txBody>
-      </p:sp>
-      <p:sp>
-        <p:nvSpPr>
-          <p:cNvPr id="45" name="Rectangle 44"/>
-          <p:cNvSpPr/>
-          <p:nvPr/>
-        </p:nvSpPr>
-        <p:spPr>
-          <a:xfrm>
-            <a:off x="1855937" y="4016896"/>
-            <a:ext cx="153293" cy="164578"/>
-          </a:xfrm>
-          <a:prstGeom prst="rect">
-            <a:avLst/>
-          </a:prstGeom>
-        </p:spPr>
-        <p:style>
-          <a:lnRef idx="2">
-            <a:schemeClr val="accent1">
-              <a:shade val="50000"/>
-            </a:schemeClr>
-          </a:lnRef>
-          <a:fillRef idx="1">
-            <a:schemeClr val="accent1"/>
-          </a:fillRef>
-          <a:effectRef idx="0">
-            <a:schemeClr val="accent1"/>
-          </a:effectRef>
-          <a:fontRef idx="minor">
-            <a:schemeClr val="lt1"/>
-          </a:fontRef>
-        </p:style>
-        <p:txBody>
-          <a:bodyPr rtlCol="0" anchor="ctr"/>
-          <a:lstStyle/>
-          <a:p>
-            <a:pPr algn="ctr"/>
-            <a:endParaRPr lang="en-US"/>
-          </a:p>
-        </p:txBody>
-      </p:sp>
-      <p:sp>
-        <p:nvSpPr>
-          <p:cNvPr id="11" name="Téglalap 10"/>
-          <p:cNvSpPr/>
-          <p:nvPr/>
-        </p:nvSpPr>
-        <p:spPr>
-          <a:xfrm>
-            <a:off x="1844824" y="56455"/>
-            <a:ext cx="4896544" cy="4284186"/>
-          </a:xfrm>
-          <a:prstGeom prst="rect">
-            <a:avLst/>
-          </a:prstGeom>
-        </p:spPr>
-        <p:style>
-          <a:lnRef idx="1">
-            <a:schemeClr val="accent3"/>
-          </a:lnRef>
-          <a:fillRef idx="3">
-            <a:schemeClr val="accent3"/>
-          </a:fillRef>
-          <a:effectRef idx="2">
-            <a:schemeClr val="accent3"/>
-          </a:effectRef>
-          <a:fontRef idx="minor">
-            <a:schemeClr val="lt1"/>
-          </a:fontRef>
-        </p:style>
-        <p:txBody>
-          <a:bodyPr rtlCol="0" anchor="ctr"/>
-          <a:lstStyle/>
-          <a:p>
-            <a:pPr algn="ctr"/>
-            <a:endParaRPr lang="en-US"/>
           </a:p>
         </p:txBody>
       </p:sp>
@@ -6859,13 +6861,14 @@
           <p:cNvPr id="17" name="Szögletes összekötő 16"/>
           <p:cNvCxnSpPr>
             <a:stCxn id="16" idx="2"/>
+            <a:endCxn id="10" idx="1"/>
           </p:cNvCxnSpPr>
           <p:nvPr/>
         </p:nvCxnSpPr>
         <p:spPr>
           <a:xfrm rot="16200000" flipH="1">
-            <a:off x="781226" y="2262983"/>
-            <a:ext cx="784272" cy="1351059"/>
+            <a:off x="786746" y="2257463"/>
+            <a:ext cx="784272" cy="1362099"/>
           </a:xfrm>
           <a:prstGeom prst="bentConnector2">
             <a:avLst/>
@@ -7098,7 +7101,7 @@
         </p:nvSpPr>
         <p:spPr>
           <a:xfrm>
-            <a:off x="1535606" y="4803138"/>
+            <a:off x="1535606" y="4815334"/>
             <a:ext cx="5205763" cy="369332"/>
           </a:xfrm>
           <a:prstGeom prst="rect">
@@ -7894,11 +7897,11 @@
             <a:pPr algn="ctr"/>
             <a:r>
               <a:rPr lang="hu-HU" sz="1200" dirty="0"/>
-              <a:t>component repo</a:t>
-            </a:r>
-            <a:r>
-              <a:rPr lang="en-US" sz="1200" dirty="0" err="1"/>
-              <a:t>sitory</a:t>
+              <a:t>component </a:t>
+            </a:r>
+            <a:r>
+              <a:rPr lang="en-US" sz="1200" dirty="0" smtClean="0"/>
+              <a:t>repository</a:t>
             </a:r>
             <a:endParaRPr lang="en-US" sz="1200" dirty="0"/>
           </a:p>
@@ -7961,8 +7964,8 @@
         </p:nvCxnSpPr>
         <p:spPr>
           <a:xfrm>
-            <a:off x="493765" y="5385048"/>
-            <a:ext cx="1" cy="358710"/>
+            <a:off x="493765" y="5418146"/>
+            <a:ext cx="1" cy="325612"/>
           </a:xfrm>
           <a:prstGeom prst="straightConnector1">
             <a:avLst/>
@@ -8167,8 +8170,8 @@
         </p:nvSpPr>
         <p:spPr>
           <a:xfrm>
-            <a:off x="25713" y="4660454"/>
-            <a:ext cx="936103" cy="724594"/>
+            <a:off x="25713" y="4660453"/>
+            <a:ext cx="936103" cy="757693"/>
           </a:xfrm>
           <a:prstGeom prst="flowChartMagneticDisk">
             <a:avLst/>
@@ -9462,13 +9465,7 @@
               <a:rPr lang="en-US" sz="1000" dirty="0" smtClean="0">
                 <a:cs typeface="Courier New" pitchFamily="49" charset="0"/>
               </a:rPr>
-              <a:t>“</a:t>
-            </a:r>
-            <a:r>
-              <a:rPr lang="en-US" sz="1000" dirty="0" smtClean="0">
-                <a:cs typeface="Courier New" pitchFamily="49" charset="0"/>
-              </a:rPr>
-              <a:t>[</a:t>
+              <a:t>“[</a:t>
             </a:r>
             <a:r>
               <a:rPr lang="en-US" sz="1000" dirty="0" err="1" smtClean="0">
@@ -9492,13 +9489,7 @@
               <a:rPr lang="en-US" sz="1000" dirty="0" smtClean="0">
                 <a:cs typeface="Courier New" pitchFamily="49" charset="0"/>
               </a:rPr>
-              <a:t>/Object;</a:t>
-            </a:r>
-            <a:r>
-              <a:rPr lang="en-US" sz="1000" dirty="0" smtClean="0">
-                <a:cs typeface="Courier New" pitchFamily="49" charset="0"/>
-              </a:rPr>
-              <a:t>”</a:t>
+              <a:t>/Object;”</a:t>
             </a:r>
             <a:endParaRPr lang="hu-HU" sz="1000" dirty="0" smtClean="0">
               <a:cs typeface="Courier New" pitchFamily="49" charset="0"/>

</xml_diff>